<commit_message>
update training to show last few steps of training for presentation purposes
</commit_message>
<xml_diff>
--- a/Presentation.pptx
+++ b/Presentation.pptx
@@ -3950,7 +3950,7 @@
           <a:lstStyle/>
           <a:p>
             <a:r>
-              <a:rPr lang="en-US" dirty="0" smtClean="0"/>
+              <a:rPr lang="en-US" sz="2400" dirty="0" smtClean="0"/>
               <a:t>Teaches robot task objective through positive and negative rewards </a:t>
             </a:r>
           </a:p>
@@ -4141,13 +4141,13 @@
           <a:lstStyle/>
           <a:p>
             <a:r>
-              <a:rPr lang="en-US" dirty="0" smtClean="0"/>
+              <a:rPr lang="en-US" sz="2800" dirty="0" smtClean="0"/>
               <a:t>Suitable for discrete space, but our space has continuous values.</a:t>
             </a:r>
           </a:p>
           <a:p>
             <a:r>
-              <a:rPr lang="en-US" dirty="0" smtClean="0"/>
+              <a:rPr lang="en-US" sz="2800" dirty="0" smtClean="0"/>
               <a:t>What do we do ?</a:t>
             </a:r>
           </a:p>
@@ -4294,7 +4294,11 @@
           <a:p>
             <a:r>
               <a:rPr lang="en-US" dirty="0" smtClean="0"/>
-              <a:t>Radial Basis Functions</a:t>
+              <a:t>Radial Basis </a:t>
+            </a:r>
+            <a:r>
+              <a:rPr lang="en-US" dirty="0" smtClean="0"/>
+              <a:t>Function Networks</a:t>
             </a:r>
             <a:endParaRPr lang="en-US" dirty="0"/>
           </a:p>
@@ -4464,11 +4468,13 @@
         </p:nvSpPr>
         <p:spPr/>
         <p:txBody>
-          <a:bodyPr/>
-          <a:lstStyle/>
-          <a:p>
-            <a:r>
-              <a:rPr lang="en-US" dirty="0" smtClean="0"/>
+          <a:bodyPr>
+            <a:normAutofit/>
+          </a:bodyPr>
+          <a:lstStyle/>
+          <a:p>
+            <a:r>
+              <a:rPr lang="en-US" sz="2400" dirty="0" smtClean="0"/>
               <a:t>Radial Basis Functions are used to store the reward and action.</a:t>
             </a:r>
           </a:p>
@@ -4543,17 +4549,19 @@
         </p:nvSpPr>
         <p:spPr/>
         <p:txBody>
-          <a:bodyPr/>
-          <a:lstStyle/>
-          <a:p>
-            <a:r>
-              <a:rPr lang="en-US" dirty="0" smtClean="0"/>
+          <a:bodyPr>
+            <a:normAutofit/>
+          </a:bodyPr>
+          <a:lstStyle/>
+          <a:p>
+            <a:r>
+              <a:rPr lang="en-US" sz="2400" dirty="0" smtClean="0"/>
               <a:t>Radial Basis Functions are used to store the reward and action.</a:t>
             </a:r>
           </a:p>
           <a:p>
             <a:r>
-              <a:rPr lang="en-US" dirty="0" smtClean="0">
+              <a:rPr lang="en-US" sz="2400" dirty="0" smtClean="0">
                 <a:solidFill>
                   <a:srgbClr val="FF0000"/>
                 </a:solidFill>
@@ -4563,41 +4571,41 @@
           </a:p>
           <a:p>
             <a:r>
-              <a:rPr lang="en-US" dirty="0" smtClean="0"/>
+              <a:rPr lang="en-US" sz="2400" dirty="0" smtClean="0"/>
               <a:t>For Rao, it is a state </a:t>
             </a:r>
             <a:r>
-              <a:rPr lang="en-US" b="1" dirty="0" err="1" smtClean="0"/>
+              <a:rPr lang="en-US" sz="2400" b="1" dirty="0" err="1" smtClean="0"/>
               <a:t>b</a:t>
             </a:r>
             <a:r>
-              <a:rPr lang="en-US" b="1" baseline="-25000" dirty="0" err="1" smtClean="0"/>
+              <a:rPr lang="en-US" sz="2400" b="1" baseline="-25000" dirty="0" err="1" smtClean="0"/>
               <a:t>s</a:t>
             </a:r>
             <a:r>
-              <a:rPr lang="en-US" b="1" baseline="-25000" dirty="0" smtClean="0"/>
+              <a:rPr lang="en-US" sz="2400" b="1" baseline="-25000" dirty="0" smtClean="0"/>
               <a:t> </a:t>
             </a:r>
             <a:r>
-              <a:rPr lang="en-US" b="1" dirty="0" smtClean="0"/>
+              <a:rPr lang="en-US" sz="2400" b="1" dirty="0" smtClean="0"/>
               <a:t>= </a:t>
             </a:r>
             <a:r>
-              <a:rPr lang="en-US" dirty="0" smtClean="0"/>
+              <a:rPr lang="en-US" sz="2400" dirty="0" smtClean="0"/>
               <a:t>[ p(left) p(right) ]</a:t>
             </a:r>
           </a:p>
           <a:p>
             <a:r>
-              <a:rPr lang="en-US" dirty="0" smtClean="0"/>
+              <a:rPr lang="en-US" sz="2400" dirty="0" smtClean="0"/>
               <a:t>In our case it is the </a:t>
             </a:r>
             <a:r>
-              <a:rPr lang="en-US" dirty="0" err="1" smtClean="0"/>
+              <a:rPr lang="en-US" sz="2400" dirty="0" err="1" smtClean="0"/>
               <a:t>eigen</a:t>
             </a:r>
             <a:r>
-              <a:rPr lang="en-US" dirty="0" smtClean="0"/>
+              <a:rPr lang="en-US" sz="2400" dirty="0" smtClean="0"/>
               <a:t> value and reward value of each target. </a:t>
             </a:r>
           </a:p>
@@ -4810,14 +4818,16 @@
         </p:nvSpPr>
         <p:spPr/>
         <p:txBody>
-          <a:bodyPr/>
-          <a:lstStyle/>
-          <a:p>
-            <a:r>
-              <a:rPr lang="en-US" dirty="0" smtClean="0"/>
+          <a:bodyPr>
+            <a:normAutofit/>
+          </a:bodyPr>
+          <a:lstStyle/>
+          <a:p>
+            <a:r>
+              <a:rPr lang="en-US" sz="2400" dirty="0" smtClean="0"/>
               <a:t>Implemented reinforcement learning over grasping uncertainty</a:t>
             </a:r>
-            <a:endParaRPr lang="en-US" dirty="0"/>
+            <a:endParaRPr lang="en-US" sz="2400" dirty="0"/>
           </a:p>
         </p:txBody>
       </p:sp>
@@ -5096,22 +5106,26 @@
           <a:lstStyle/>
           <a:p>
             <a:r>
+              <a:rPr lang="en-US" sz="2400" dirty="0" smtClean="0"/>
+              <a:t>Optimal gaze control thesis by Nunez Varela</a:t>
+            </a:r>
+          </a:p>
+          <a:p>
+            <a:r>
+              <a:rPr lang="en-US" sz="2400" dirty="0" smtClean="0"/>
+              <a:t>Decision under uncertainty paper by </a:t>
+            </a:r>
+            <a:r>
+              <a:rPr lang="en-US" sz="2400" dirty="0" err="1" smtClean="0"/>
+              <a:t>Rashej</a:t>
+            </a:r>
+            <a:r>
+              <a:rPr lang="en-US" sz="2400" dirty="0" smtClean="0"/>
+              <a:t> Rao ( 2010 </a:t>
+            </a:r>
+            <a:r>
               <a:rPr lang="en-US" dirty="0" smtClean="0"/>
-              <a:t>Optimal gaze control thesis by Nunez Varela</a:t>
-            </a:r>
-          </a:p>
-          <a:p>
-            <a:r>
-              <a:rPr lang="en-US" dirty="0" smtClean="0"/>
-              <a:t>Decision under uncertainty paper by </a:t>
-            </a:r>
-            <a:r>
-              <a:rPr lang="en-US" dirty="0" err="1" smtClean="0"/>
-              <a:t>Rashej</a:t>
-            </a:r>
-            <a:r>
-              <a:rPr lang="en-US" dirty="0" smtClean="0"/>
-              <a:t> Rao ( 2010 )</a:t>
+              <a:t>)</a:t>
             </a:r>
             <a:endParaRPr lang="en-US" dirty="0"/>
           </a:p>
@@ -5182,26 +5196,32 @@
         </p:nvSpPr>
         <p:spPr/>
         <p:txBody>
-          <a:bodyPr/>
-          <a:lstStyle/>
-          <a:p>
-            <a:r>
-              <a:rPr lang="en-US" dirty="0" smtClean="0"/>
+          <a:bodyPr>
+            <a:normAutofit/>
+          </a:bodyPr>
+          <a:lstStyle/>
+          <a:p>
+            <a:r>
+              <a:rPr lang="en-US" sz="2400" dirty="0" smtClean="0"/>
               <a:t>1. Particle Filters </a:t>
             </a:r>
           </a:p>
           <a:p>
             <a:r>
-              <a:rPr lang="en-US" dirty="0" smtClean="0"/>
+              <a:rPr lang="en-US" sz="2400" dirty="0" smtClean="0"/>
               <a:t>2. Reinforcement Learning</a:t>
             </a:r>
           </a:p>
           <a:p>
             <a:r>
-              <a:rPr lang="en-US" dirty="0" smtClean="0"/>
-              <a:t>3. Radial Basis Functions</a:t>
-            </a:r>
-            <a:endParaRPr lang="en-US" dirty="0"/>
+              <a:rPr lang="en-US" sz="2400" dirty="0" smtClean="0"/>
+              <a:t>3. Radial Basis </a:t>
+            </a:r>
+            <a:r>
+              <a:rPr lang="en-US" sz="2400" dirty="0" smtClean="0"/>
+              <a:t>Function Networks</a:t>
+            </a:r>
+            <a:endParaRPr lang="en-US" sz="2400" dirty="0"/>
           </a:p>
         </p:txBody>
       </p:sp>
@@ -5270,36 +5290,43 @@
         </p:nvSpPr>
         <p:spPr/>
         <p:txBody>
-          <a:bodyPr/>
-          <a:lstStyle/>
-          <a:p>
-            <a:r>
-              <a:rPr lang="en-US" dirty="0" smtClean="0"/>
+          <a:bodyPr>
+            <a:normAutofit/>
+          </a:bodyPr>
+          <a:lstStyle/>
+          <a:p>
+            <a:r>
+              <a:rPr lang="en-US" sz="2400" dirty="0" smtClean="0"/>
               <a:t>1. Particle Filters </a:t>
             </a:r>
           </a:p>
           <a:p>
             <a:r>
-              <a:rPr lang="en-US" dirty="0" smtClean="0"/>
+              <a:rPr lang="en-US" sz="2400" dirty="0" smtClean="0"/>
               <a:t>2. Reinforcement Learning</a:t>
             </a:r>
           </a:p>
           <a:p>
             <a:r>
-              <a:rPr lang="en-US" dirty="0" smtClean="0"/>
-              <a:t>3. Radial Basis Functions</a:t>
-            </a:r>
-          </a:p>
-          <a:p>
-            <a:r>
-              <a:rPr lang="en-US" dirty="0" smtClean="0">
+              <a:rPr lang="en-US" sz="2400" dirty="0" smtClean="0"/>
+              <a:t>3. Radial Basis </a:t>
+            </a:r>
+            <a:r>
+              <a:rPr lang="en-US" sz="2400" dirty="0" smtClean="0"/>
+              <a:t>Function Networks</a:t>
+            </a:r>
+            <a:endParaRPr lang="en-US" sz="2400" dirty="0" smtClean="0"/>
+          </a:p>
+          <a:p>
+            <a:r>
+              <a:rPr lang="en-US" sz="2400" dirty="0" smtClean="0">
                 <a:solidFill>
                   <a:srgbClr val="FF0000"/>
                 </a:solidFill>
               </a:rPr>
               <a:t>4. Learning formula for where to optimally look</a:t>
             </a:r>
-            <a:endParaRPr lang="en-US" dirty="0">
+            <a:endParaRPr lang="en-US" sz="2400" dirty="0">
               <a:solidFill>
                 <a:srgbClr val="FF0000"/>
               </a:solidFill>

</xml_diff>